<commit_message>
added Execution Plan in ppt
</commit_message>
<xml_diff>
--- a/Level 2/GRiD_ Electronic Invoicing using Image Processing_TwoAndAHalfMen_IISc.pptx
+++ b/Level 2/GRiD_ Electronic Invoicing using Image Processing_TwoAndAHalfMen_IISc.pptx
@@ -18011,7 +18011,7 @@
         <p:spPr>
           <a:xfrm>
             <a:off x="135875" y="865275"/>
-            <a:ext cx="8646618" cy="276999"/>
+            <a:ext cx="8646618" cy="3600986"/>
           </a:xfrm>
           <a:prstGeom prst="rect">
             <a:avLst/>
@@ -18029,12 +18029,183 @@
                 <a:latin typeface="Roboto Mono" panose="020B0604020202020204" charset="0"/>
                 <a:ea typeface="Roboto Mono" panose="020B0604020202020204" charset="0"/>
               </a:rPr>
-              <a:t>P</a:t>
+              <a:t>Dataset Preparation:</a:t>
             </a:r>
+          </a:p>
+          <a:p>
+            <a:pPr marL="171450" indent="-171450">
+              <a:buFont typeface="Symbol" panose="05050102010706020507" pitchFamily="18" charset="2"/>
+              <a:buChar char="·"/>
+            </a:pPr>
+            <a:r>
+              <a:rPr lang="en-US" sz="1200" dirty="0">
+                <a:latin typeface="Roboto Mono" panose="020B0604020202020204" charset="0"/>
+                <a:ea typeface="Roboto Mono" panose="020B0604020202020204" charset="0"/>
+              </a:rPr>
+              <a:t>We plan to combine data from multiple publicly available sources, namely, ICDAR-13, ICDAR-19, Marmot and a </a:t>
+            </a:r>
+            <a:r>
+              <a:rPr lang="en-US" sz="1200" dirty="0">
+                <a:latin typeface="Roboto Mono" panose="020B0604020202020204" charset="0"/>
+                <a:ea typeface="Roboto Mono" panose="020B0604020202020204" charset="0"/>
+                <a:hlinkClick r:id="rId4"/>
+              </a:rPr>
+              <a:t>custom</a:t>
+            </a:r>
+            <a:r>
+              <a:rPr lang="en-US" sz="1200" dirty="0">
+                <a:latin typeface="Roboto Mono" panose="020B0604020202020204" charset="0"/>
+                <a:ea typeface="Roboto Mono" panose="020B0604020202020204" charset="0"/>
+              </a:rPr>
+              <a:t> dataset, as indicated in the CascadeTabNet paper.</a:t>
+            </a:r>
+          </a:p>
+          <a:p>
+            <a:pPr marL="171450" indent="-171450">
+              <a:buFont typeface="Symbol" panose="05050102010706020507" pitchFamily="18" charset="2"/>
+              <a:buChar char="·"/>
+            </a:pPr>
             <a:endParaRPr lang="en-US" sz="1200" dirty="0">
               <a:latin typeface="Roboto Mono" panose="020B0604020202020204" charset="0"/>
               <a:ea typeface="Roboto Mono" panose="020B0604020202020204" charset="0"/>
             </a:endParaRPr>
+          </a:p>
+          <a:p>
+            <a:pPr marL="171450" indent="-171450">
+              <a:buFont typeface="Symbol" panose="05050102010706020507" pitchFamily="18" charset="2"/>
+              <a:buChar char="·"/>
+            </a:pPr>
+            <a:r>
+              <a:rPr lang="en-US" sz="1200" dirty="0">
+                <a:latin typeface="Roboto Mono" panose="020B0604020202020204" charset="0"/>
+                <a:ea typeface="Roboto Mono" panose="020B0604020202020204" charset="0"/>
+              </a:rPr>
+              <a:t>We plan to use this combined dataset as out training split for table detection and instance segmentation.</a:t>
+            </a:r>
+          </a:p>
+          <a:p>
+            <a:pPr marL="171450" indent="-171450">
+              <a:buFont typeface="Symbol" panose="05050102010706020507" pitchFamily="18" charset="2"/>
+              <a:buChar char="·"/>
+            </a:pPr>
+            <a:endParaRPr lang="en-US" sz="1200" dirty="0">
+              <a:latin typeface="Roboto Mono" panose="020B0604020202020204" charset="0"/>
+              <a:ea typeface="Roboto Mono" panose="020B0604020202020204" charset="0"/>
+            </a:endParaRPr>
+          </a:p>
+          <a:p>
+            <a:r>
+              <a:rPr lang="en-US" sz="1200" b="1" dirty="0">
+                <a:latin typeface="Roboto Mono" panose="020B0604020202020204" charset="0"/>
+                <a:ea typeface="Roboto Mono" panose="020B0604020202020204" charset="0"/>
+              </a:rPr>
+              <a:t>Dataset Augmentation:</a:t>
+            </a:r>
+          </a:p>
+          <a:p>
+            <a:pPr marL="171450" indent="-171450">
+              <a:buFont typeface="Symbol" panose="05050102010706020507" pitchFamily="18" charset="2"/>
+              <a:buChar char="·"/>
+            </a:pPr>
+            <a:r>
+              <a:rPr lang="en-US" sz="1200" dirty="0">
+                <a:latin typeface="Roboto Mono" panose="020B0604020202020204" charset="0"/>
+                <a:ea typeface="Roboto Mono" panose="020B0604020202020204" charset="0"/>
+              </a:rPr>
+              <a:t>Also, as CascadeTabNet suggests, we plan to augment more images to the training set using the Smudge and Dilation Transformations.</a:t>
+            </a:r>
+          </a:p>
+          <a:p>
+            <a:pPr marL="171450" indent="-171450">
+              <a:buFont typeface="Symbol" panose="05050102010706020507" pitchFamily="18" charset="2"/>
+              <a:buChar char="·"/>
+            </a:pPr>
+            <a:endParaRPr lang="en-US" sz="1200" dirty="0">
+              <a:latin typeface="Roboto Mono" panose="020B0604020202020204" charset="0"/>
+              <a:ea typeface="Roboto Mono" panose="020B0604020202020204" charset="0"/>
+            </a:endParaRPr>
+          </a:p>
+          <a:p>
+            <a:pPr marL="171450" indent="-171450">
+              <a:buFont typeface="Symbol" panose="05050102010706020507" pitchFamily="18" charset="2"/>
+              <a:buChar char="·"/>
+            </a:pPr>
+            <a:r>
+              <a:rPr lang="en-US" sz="1200" dirty="0">
+                <a:latin typeface="Roboto Mono" panose="020B0604020202020204" charset="0"/>
+                <a:ea typeface="Roboto Mono" panose="020B0604020202020204" charset="0"/>
+              </a:rPr>
+              <a:t>This is important because the model can learn effectively if the training set is large.</a:t>
+            </a:r>
+          </a:p>
+          <a:p>
+            <a:pPr marL="171450" indent="-171450">
+              <a:buFont typeface="Symbol" panose="05050102010706020507" pitchFamily="18" charset="2"/>
+              <a:buChar char="·"/>
+            </a:pPr>
+            <a:endParaRPr lang="en-US" sz="1200" dirty="0">
+              <a:latin typeface="Roboto Mono" panose="020B0604020202020204" charset="0"/>
+              <a:ea typeface="Roboto Mono" panose="020B0604020202020204" charset="0"/>
+            </a:endParaRPr>
+          </a:p>
+          <a:p>
+            <a:r>
+              <a:rPr lang="en-US" sz="1200" b="1" dirty="0">
+                <a:latin typeface="Roboto Mono" panose="020B0604020202020204" charset="0"/>
+                <a:ea typeface="Roboto Mono" panose="020B0604020202020204" charset="0"/>
+              </a:rPr>
+              <a:t>Model Construction and Fine-Tuning:</a:t>
+            </a:r>
+          </a:p>
+          <a:p>
+            <a:pPr marL="171450" indent="-171450">
+              <a:buFont typeface="Symbol" panose="05050102010706020507" pitchFamily="18" charset="2"/>
+              <a:buChar char="·"/>
+            </a:pPr>
+            <a:r>
+              <a:rPr lang="en-US" sz="1200" dirty="0">
+                <a:latin typeface="Roboto Mono" panose="020B0604020202020204" charset="0"/>
+                <a:ea typeface="Roboto Mono" panose="020B0604020202020204" charset="0"/>
+              </a:rPr>
+              <a:t>The mmdetection toolbox contains the Cascade Mask R-CNN and HRNet models, pretrained on ImageNet. </a:t>
+            </a:r>
+          </a:p>
+          <a:p>
+            <a:pPr marL="171450" indent="-171450">
+              <a:buFont typeface="Symbol" panose="05050102010706020507" pitchFamily="18" charset="2"/>
+              <a:buChar char="·"/>
+            </a:pPr>
+            <a:endParaRPr lang="en-US" sz="1200" dirty="0">
+              <a:latin typeface="Roboto Mono" panose="020B0604020202020204" charset="0"/>
+              <a:ea typeface="Roboto Mono" panose="020B0604020202020204" charset="0"/>
+            </a:endParaRPr>
+          </a:p>
+          <a:p>
+            <a:pPr marL="171450" indent="-171450">
+              <a:buFont typeface="Symbol" panose="05050102010706020507" pitchFamily="18" charset="2"/>
+              <a:buChar char="·"/>
+            </a:pPr>
+            <a:r>
+              <a:rPr lang="en-US" sz="1200" dirty="0">
+                <a:latin typeface="Roboto Mono" panose="020B0604020202020204" charset="0"/>
+                <a:ea typeface="Roboto Mono" panose="020B0604020202020204" charset="0"/>
+              </a:rPr>
+              <a:t>We plan to combine (as explained in the </a:t>
+            </a:r>
+            <a:r>
+              <a:rPr lang="en-US" sz="1200" i="1" dirty="0">
+                <a:latin typeface="Roboto Mono" panose="020B0604020202020204" charset="0"/>
+                <a:ea typeface="Roboto Mono" panose="020B0604020202020204" charset="0"/>
+              </a:rPr>
+              <a:t>Architecture</a:t>
+            </a:r>
+            <a:r>
+              <a:rPr lang="en-US" sz="1200" dirty="0">
+                <a:latin typeface="Roboto Mono" panose="020B0604020202020204" charset="0"/>
+                <a:ea typeface="Roboto Mono" panose="020B0604020202020204" charset="0"/>
+              </a:rPr>
+              <a:t> Section) and fine-tune them on the augmented dataset.</a:t>
+            </a:r>
           </a:p>
         </p:txBody>
       </p:sp>
@@ -18143,6 +18314,36 @@
           </a:p>
         </p:txBody>
       </p:sp>
+      <p:pic>
+        <p:nvPicPr>
+          <p:cNvPr id="5" name="Picture 4" descr="A screenshot of a cell phone&#10;&#10;Description automatically generated">
+            <a:extLst>
+              <a:ext uri="{FF2B5EF4-FFF2-40B4-BE49-F238E27FC236}">
+                <a16:creationId xmlns:a16="http://schemas.microsoft.com/office/drawing/2014/main" id="{42E33508-4C5F-45C8-A06D-319CB9F50DF5}"/>
+              </a:ext>
+            </a:extLst>
+          </p:cNvPr>
+          <p:cNvPicPr>
+            <a:picLocks noChangeAspect="1"/>
+          </p:cNvPicPr>
+          <p:nvPr/>
+        </p:nvPicPr>
+        <p:blipFill>
+          <a:blip r:embed="rId4"/>
+          <a:stretch>
+            <a:fillRect/>
+          </a:stretch>
+        </p:blipFill>
+        <p:spPr>
+          <a:xfrm>
+            <a:off x="903767" y="865274"/>
+            <a:ext cx="7176977" cy="3621665"/>
+          </a:xfrm>
+          <a:prstGeom prst="rect">
+            <a:avLst/>
+          </a:prstGeom>
+        </p:spPr>
+      </p:pic>
     </p:spTree>
   </p:cSld>
   <p:clrMapOvr>

</xml_diff>

<commit_message>
added missing headers in execution plan ppt
</commit_message>
<xml_diff>
--- a/Level 2/GRiD_ Electronic Invoicing using Image Processing_TwoAndAHalfMen_IISc.pptx
+++ b/Level 2/GRiD_ Electronic Invoicing using Image Processing_TwoAndAHalfMen_IISc.pptx
@@ -18010,8 +18010,8 @@
         </p:nvSpPr>
         <p:spPr>
           <a:xfrm>
-            <a:off x="135875" y="865275"/>
-            <a:ext cx="8646618" cy="3600986"/>
+            <a:off x="135875" y="748317"/>
+            <a:ext cx="8646618" cy="4708981"/>
           </a:xfrm>
           <a:prstGeom prst="rect">
             <a:avLst/>
@@ -18024,16 +18024,17 @@
           </a:bodyPr>
           <a:lstStyle/>
           <a:p>
+            <a:pPr algn="just"/>
             <a:r>
               <a:rPr lang="en-US" sz="1200" b="1" dirty="0">
                 <a:latin typeface="Roboto Mono" panose="020B0604020202020204" charset="0"/>
                 <a:ea typeface="Roboto Mono" panose="020B0604020202020204" charset="0"/>
               </a:rPr>
-              <a:t>Dataset Preparation:</a:t>
+              <a:t>Dataset Preparation and Augmentation:</a:t>
             </a:r>
           </a:p>
           <a:p>
-            <a:pPr marL="171450" indent="-171450">
+            <a:pPr marL="171450" indent="-171450" algn="just">
               <a:buFont typeface="Symbol" panose="05050102010706020507" pitchFamily="18" charset="2"/>
               <a:buChar char="·"/>
             </a:pPr>
@@ -18057,21 +18058,11 @@
                 <a:latin typeface="Roboto Mono" panose="020B0604020202020204" charset="0"/>
                 <a:ea typeface="Roboto Mono" panose="020B0604020202020204" charset="0"/>
               </a:rPr>
-              <a:t> dataset, as indicated in the CascadeTabNet paper.</a:t>
+              <a:t> dataset, as indicated in the CascadeTabNet paper. This combined dataset will then be used as the training set for table detection and instance segmentation.</a:t>
             </a:r>
           </a:p>
           <a:p>
-            <a:pPr marL="171450" indent="-171450">
-              <a:buFont typeface="Symbol" panose="05050102010706020507" pitchFamily="18" charset="2"/>
-              <a:buChar char="·"/>
-            </a:pPr>
-            <a:endParaRPr lang="en-US" sz="1200" dirty="0">
-              <a:latin typeface="Roboto Mono" panose="020B0604020202020204" charset="0"/>
-              <a:ea typeface="Roboto Mono" panose="020B0604020202020204" charset="0"/>
-            </a:endParaRPr>
-          </a:p>
-          <a:p>
-            <a:pPr marL="171450" indent="-171450">
+            <a:pPr marL="171450" indent="-171450" algn="just">
               <a:buFont typeface="Symbol" panose="05050102010706020507" pitchFamily="18" charset="2"/>
               <a:buChar char="·"/>
             </a:pPr>
@@ -18080,75 +18071,18 @@
                 <a:latin typeface="Roboto Mono" panose="020B0604020202020204" charset="0"/>
                 <a:ea typeface="Roboto Mono" panose="020B0604020202020204" charset="0"/>
               </a:rPr>
-              <a:t>We plan to use this combined dataset as out training split for table detection and instance segmentation.</a:t>
+              <a:t>Also, as CascadeTabNet suggests, we’ll further augment more images to the training set using the Smudge and Dilation Transformations.</a:t>
             </a:r>
           </a:p>
           <a:p>
-            <a:pPr marL="171450" indent="-171450">
-              <a:buFont typeface="Symbol" panose="05050102010706020507" pitchFamily="18" charset="2"/>
-              <a:buChar char="·"/>
-            </a:pPr>
+            <a:pPr algn="just"/>
             <a:endParaRPr lang="en-US" sz="1200" dirty="0">
               <a:latin typeface="Roboto Mono" panose="020B0604020202020204" charset="0"/>
               <a:ea typeface="Roboto Mono" panose="020B0604020202020204" charset="0"/>
             </a:endParaRPr>
           </a:p>
           <a:p>
-            <a:r>
-              <a:rPr lang="en-US" sz="1200" b="1" dirty="0">
-                <a:latin typeface="Roboto Mono" panose="020B0604020202020204" charset="0"/>
-                <a:ea typeface="Roboto Mono" panose="020B0604020202020204" charset="0"/>
-              </a:rPr>
-              <a:t>Dataset Augmentation:</a:t>
-            </a:r>
-          </a:p>
-          <a:p>
-            <a:pPr marL="171450" indent="-171450">
-              <a:buFont typeface="Symbol" panose="05050102010706020507" pitchFamily="18" charset="2"/>
-              <a:buChar char="·"/>
-            </a:pPr>
-            <a:r>
-              <a:rPr lang="en-US" sz="1200" dirty="0">
-                <a:latin typeface="Roboto Mono" panose="020B0604020202020204" charset="0"/>
-                <a:ea typeface="Roboto Mono" panose="020B0604020202020204" charset="0"/>
-              </a:rPr>
-              <a:t>Also, as CascadeTabNet suggests, we plan to augment more images to the training set using the Smudge and Dilation Transformations.</a:t>
-            </a:r>
-          </a:p>
-          <a:p>
-            <a:pPr marL="171450" indent="-171450">
-              <a:buFont typeface="Symbol" panose="05050102010706020507" pitchFamily="18" charset="2"/>
-              <a:buChar char="·"/>
-            </a:pPr>
-            <a:endParaRPr lang="en-US" sz="1200" dirty="0">
-              <a:latin typeface="Roboto Mono" panose="020B0604020202020204" charset="0"/>
-              <a:ea typeface="Roboto Mono" panose="020B0604020202020204" charset="0"/>
-            </a:endParaRPr>
-          </a:p>
-          <a:p>
-            <a:pPr marL="171450" indent="-171450">
-              <a:buFont typeface="Symbol" panose="05050102010706020507" pitchFamily="18" charset="2"/>
-              <a:buChar char="·"/>
-            </a:pPr>
-            <a:r>
-              <a:rPr lang="en-US" sz="1200" dirty="0">
-                <a:latin typeface="Roboto Mono" panose="020B0604020202020204" charset="0"/>
-                <a:ea typeface="Roboto Mono" panose="020B0604020202020204" charset="0"/>
-              </a:rPr>
-              <a:t>This is important because the model can learn effectively if the training set is large.</a:t>
-            </a:r>
-          </a:p>
-          <a:p>
-            <a:pPr marL="171450" indent="-171450">
-              <a:buFont typeface="Symbol" panose="05050102010706020507" pitchFamily="18" charset="2"/>
-              <a:buChar char="·"/>
-            </a:pPr>
-            <a:endParaRPr lang="en-US" sz="1200" dirty="0">
-              <a:latin typeface="Roboto Mono" panose="020B0604020202020204" charset="0"/>
-              <a:ea typeface="Roboto Mono" panose="020B0604020202020204" charset="0"/>
-            </a:endParaRPr>
-          </a:p>
-          <a:p>
+            <a:pPr algn="just"/>
             <a:r>
               <a:rPr lang="en-US" sz="1200" b="1" dirty="0">
                 <a:latin typeface="Roboto Mono" panose="020B0604020202020204" charset="0"/>
@@ -18158,7 +18092,7 @@
             </a:r>
           </a:p>
           <a:p>
-            <a:pPr marL="171450" indent="-171450">
+            <a:pPr marL="171450" indent="-171450" algn="just">
               <a:buFont typeface="Symbol" panose="05050102010706020507" pitchFamily="18" charset="2"/>
               <a:buChar char="·"/>
             </a:pPr>
@@ -18167,30 +18101,34 @@
                 <a:latin typeface="Roboto Mono" panose="020B0604020202020204" charset="0"/>
                 <a:ea typeface="Roboto Mono" panose="020B0604020202020204" charset="0"/>
               </a:rPr>
-              <a:t>The mmdetection toolbox contains the Cascade Mask R-CNN and HRNet models, pretrained on ImageNet. </a:t>
+              <a:t>The mmdetection toolbox contains the Cascade Mask R-CNN and HRNet models, pretrained on ImageNet</a:t>
+            </a:r>
+            <a:r>
+              <a:rPr lang="en-US" sz="1200">
+                <a:latin typeface="Roboto Mono" panose="020B0604020202020204" charset="0"/>
+                <a:ea typeface="Roboto Mono" panose="020B0604020202020204" charset="0"/>
+              </a:rPr>
+              <a:t>. </a:t>
             </a:r>
           </a:p>
           <a:p>
-            <a:pPr marL="171450" indent="-171450">
+            <a:pPr marL="171450" indent="-171450" algn="just">
               <a:buFont typeface="Symbol" panose="05050102010706020507" pitchFamily="18" charset="2"/>
               <a:buChar char="·"/>
             </a:pPr>
-            <a:endParaRPr lang="en-US" sz="1200" dirty="0">
-              <a:latin typeface="Roboto Mono" panose="020B0604020202020204" charset="0"/>
-              <a:ea typeface="Roboto Mono" panose="020B0604020202020204" charset="0"/>
-            </a:endParaRPr>
-          </a:p>
-          <a:p>
-            <a:pPr marL="171450" indent="-171450">
-              <a:buFont typeface="Symbol" panose="05050102010706020507" pitchFamily="18" charset="2"/>
-              <a:buChar char="·"/>
-            </a:pPr>
+            <a:r>
+              <a:rPr lang="en-US" sz="1200">
+                <a:latin typeface="Roboto Mono" panose="020B0604020202020204" charset="0"/>
+                <a:ea typeface="Roboto Mono" panose="020B0604020202020204" charset="0"/>
+              </a:rPr>
+              <a:t>We </a:t>
+            </a:r>
             <a:r>
               <a:rPr lang="en-US" sz="1200" dirty="0">
                 <a:latin typeface="Roboto Mono" panose="020B0604020202020204" charset="0"/>
                 <a:ea typeface="Roboto Mono" panose="020B0604020202020204" charset="0"/>
               </a:rPr>
-              <a:t>We plan to combine (as explained in the </a:t>
+              <a:t>plan to combine these models, as explained in the </a:t>
             </a:r>
             <a:r>
               <a:rPr lang="en-US" sz="1200" i="1" dirty="0">
@@ -18204,8 +18142,142 @@
                 <a:latin typeface="Roboto Mono" panose="020B0604020202020204" charset="0"/>
                 <a:ea typeface="Roboto Mono" panose="020B0604020202020204" charset="0"/>
               </a:rPr>
-              <a:t> Section) and fine-tune them on the augmented dataset.</a:t>
+              <a:t> Section, and fine-tune them on the augmented dataset.</a:t>
             </a:r>
+          </a:p>
+          <a:p>
+            <a:pPr marL="171450" indent="-171450" algn="just">
+              <a:buFont typeface="Symbol" panose="05050102010706020507" pitchFamily="18" charset="2"/>
+              <a:buChar char="·"/>
+            </a:pPr>
+            <a:endParaRPr lang="en-US" sz="1200" dirty="0">
+              <a:latin typeface="Roboto Mono" panose="020B0604020202020204" charset="0"/>
+              <a:ea typeface="Roboto Mono" panose="020B0604020202020204" charset="0"/>
+            </a:endParaRPr>
+          </a:p>
+          <a:p>
+            <a:pPr algn="just"/>
+            <a:r>
+              <a:rPr lang="en-US" sz="1200" b="1" dirty="0">
+                <a:latin typeface="Roboto Mono" panose="020B0604020202020204" charset="0"/>
+                <a:ea typeface="Roboto Mono" panose="020B0604020202020204" charset="0"/>
+              </a:rPr>
+              <a:t>Text Extraction and Refinement:</a:t>
+            </a:r>
+          </a:p>
+          <a:p>
+            <a:pPr marL="171450" indent="-171450" algn="just">
+              <a:buFont typeface="Symbol" panose="05050102010706020507" pitchFamily="18" charset="2"/>
+              <a:buChar char="·"/>
+            </a:pPr>
+            <a:r>
+              <a:rPr lang="en-US" sz="1200" dirty="0">
+                <a:latin typeface="Roboto Mono" panose="020B0604020202020204" charset="0"/>
+                <a:ea typeface="Roboto Mono" panose="020B0604020202020204" charset="0"/>
+              </a:rPr>
+              <a:t>We would then extract the text from segmented regions through Tesseract OCR. </a:t>
+            </a:r>
+          </a:p>
+          <a:p>
+            <a:pPr marL="171450" indent="-171450" algn="just">
+              <a:buFont typeface="Symbol" panose="05050102010706020507" pitchFamily="18" charset="2"/>
+              <a:buChar char="·"/>
+            </a:pPr>
+            <a:r>
+              <a:rPr lang="en-US" sz="1200" dirty="0">
+                <a:latin typeface="Roboto Mono" panose="020B0604020202020204" charset="0"/>
+                <a:ea typeface="Roboto Mono" panose="020B0604020202020204" charset="0"/>
+              </a:rPr>
+              <a:t>Since the OCR outputs could be noisy, we’ll refine them further using algorithms like Minimum Edit Distance.</a:t>
+            </a:r>
+          </a:p>
+          <a:p>
+            <a:pPr marL="171450" indent="-171450" algn="just">
+              <a:buFont typeface="Symbol" panose="05050102010706020507" pitchFamily="18" charset="2"/>
+              <a:buChar char="·"/>
+            </a:pPr>
+            <a:endParaRPr lang="en-US" sz="1200" dirty="0">
+              <a:latin typeface="Roboto Mono" panose="020B0604020202020204" charset="0"/>
+              <a:ea typeface="Roboto Mono" panose="020B0604020202020204" charset="0"/>
+            </a:endParaRPr>
+          </a:p>
+          <a:p>
+            <a:pPr algn="just"/>
+            <a:r>
+              <a:rPr lang="en-US" sz="1200" b="1" dirty="0">
+                <a:latin typeface="Roboto Mono" panose="020B0604020202020204" charset="0"/>
+                <a:ea typeface="Roboto Mono" panose="020B0604020202020204" charset="0"/>
+              </a:rPr>
+              <a:t>Generating output file:</a:t>
+            </a:r>
+          </a:p>
+          <a:p>
+            <a:pPr marL="171450" indent="-171450" algn="just">
+              <a:buFont typeface="Symbol" panose="05050102010706020507" pitchFamily="18" charset="2"/>
+              <a:buChar char="·"/>
+            </a:pPr>
+            <a:r>
+              <a:rPr lang="en-US" sz="1200" dirty="0">
+                <a:latin typeface="Roboto Mono" panose="020B0604020202020204" charset="0"/>
+                <a:ea typeface="Roboto Mono" panose="020B0604020202020204" charset="0"/>
+              </a:rPr>
+              <a:t>The filtered text will be placed in the respective columns of the output Excel file through some </a:t>
+            </a:r>
+            <a:r>
+              <a:rPr lang="en-US" sz="1200" dirty="0" err="1">
+                <a:latin typeface="Roboto Mono" panose="020B0604020202020204" charset="0"/>
+                <a:ea typeface="Roboto Mono" panose="020B0604020202020204" charset="0"/>
+              </a:rPr>
+              <a:t>RegEx</a:t>
+            </a:r>
+            <a:r>
+              <a:rPr lang="en-US" sz="1200" dirty="0">
+                <a:latin typeface="Roboto Mono" panose="020B0604020202020204" charset="0"/>
+                <a:ea typeface="Roboto Mono" panose="020B0604020202020204" charset="0"/>
+              </a:rPr>
+              <a:t> and </a:t>
+            </a:r>
+            <a:r>
+              <a:rPr lang="en-US" sz="1200" dirty="0" err="1">
+                <a:latin typeface="Roboto Mono" panose="020B0604020202020204" charset="0"/>
+                <a:ea typeface="Roboto Mono" panose="020B0604020202020204" charset="0"/>
+              </a:rPr>
+              <a:t>Levenshtein</a:t>
+            </a:r>
+            <a:r>
+              <a:rPr lang="en-US" sz="1200" dirty="0">
+                <a:latin typeface="Roboto Mono" panose="020B0604020202020204" charset="0"/>
+                <a:ea typeface="Roboto Mono" panose="020B0604020202020204" charset="0"/>
+              </a:rPr>
+              <a:t> distance matching of columns.</a:t>
+            </a:r>
+          </a:p>
+          <a:p>
+            <a:pPr marL="171450" indent="-171450" algn="just">
+              <a:buFont typeface="Symbol" panose="05050102010706020507" pitchFamily="18" charset="2"/>
+              <a:buChar char="·"/>
+            </a:pPr>
+            <a:endParaRPr lang="en-US" sz="1200" dirty="0">
+              <a:latin typeface="Roboto Mono" panose="020B0604020202020204" charset="0"/>
+              <a:ea typeface="Roboto Mono" panose="020B0604020202020204" charset="0"/>
+            </a:endParaRPr>
+          </a:p>
+          <a:p>
+            <a:pPr marL="171450" indent="-171450" algn="just">
+              <a:buFont typeface="Symbol" panose="05050102010706020507" pitchFamily="18" charset="2"/>
+              <a:buChar char="·"/>
+            </a:pPr>
+            <a:endParaRPr lang="en-US" sz="1200" dirty="0">
+              <a:latin typeface="Roboto Mono" panose="020B0604020202020204" charset="0"/>
+              <a:ea typeface="Roboto Mono" panose="020B0604020202020204" charset="0"/>
+            </a:endParaRPr>
+          </a:p>
+          <a:p>
+            <a:pPr algn="just"/>
+            <a:endParaRPr lang="en-US" sz="1200" dirty="0">
+              <a:latin typeface="Roboto Mono" panose="020B0604020202020204" charset="0"/>
+              <a:ea typeface="Roboto Mono" panose="020B0604020202020204" charset="0"/>
+            </a:endParaRPr>
           </a:p>
         </p:txBody>
       </p:sp>
@@ -18336,8 +18408,8 @@
         </p:blipFill>
         <p:spPr>
           <a:xfrm>
-            <a:off x="903767" y="865274"/>
-            <a:ext cx="7176977" cy="3621665"/>
+            <a:off x="903767" y="865275"/>
+            <a:ext cx="7292100" cy="3749256"/>
           </a:xfrm>
           <a:prstGeom prst="rect">
             <a:avLst/>
@@ -20031,8 +20103,8 @@
         </p:nvSpPr>
         <p:spPr>
           <a:xfrm>
-            <a:off x="135875" y="865275"/>
-            <a:ext cx="8304028" cy="3970318"/>
+            <a:off x="135874" y="865275"/>
+            <a:ext cx="8710413" cy="3970318"/>
           </a:xfrm>
           <a:prstGeom prst="rect">
             <a:avLst/>
@@ -20045,7 +20117,7 @@
           </a:bodyPr>
           <a:lstStyle/>
           <a:p>
-            <a:pPr marL="171450" indent="-171450">
+            <a:pPr marL="171450" indent="-171450" algn="just">
               <a:buSzPct val="100000"/>
               <a:buFont typeface="Symbol" panose="05050102010706020507" pitchFamily="18" charset="2"/>
               <a:buChar char=""/>
@@ -20084,7 +20156,7 @@
             </a:endParaRPr>
           </a:p>
           <a:p>
-            <a:pPr marL="171450" lvl="4" indent="-171450">
+            <a:pPr marL="171450" lvl="4" indent="-171450" algn="just">
               <a:buSzPct val="25000"/>
               <a:buFont typeface="Arial" panose="020B0604020202020204" pitchFamily="34" charset="0"/>
               <a:buChar char="•"/>
@@ -20107,7 +20179,7 @@
             </a:r>
           </a:p>
           <a:p>
-            <a:pPr marL="171450" lvl="6" indent="-171450">
+            <a:pPr marL="171450" lvl="6" indent="-171450" algn="just">
               <a:buSzPct val="25000"/>
               <a:buFont typeface="Arial" panose="020B0604020202020204" pitchFamily="34" charset="0"/>
               <a:buChar char="•"/>
@@ -20122,7 +20194,7 @@
             </a:r>
           </a:p>
           <a:p>
-            <a:pPr marL="171450" lvl="6" indent="-171450">
+            <a:pPr marL="171450" lvl="6" indent="-171450" algn="just">
               <a:buSzPct val="25000"/>
               <a:buFont typeface="Arial" panose="020B0604020202020204" pitchFamily="34" charset="0"/>
               <a:buChar char="•"/>
@@ -20134,7 +20206,7 @@
             </a:endParaRPr>
           </a:p>
           <a:p>
-            <a:pPr marL="171450" lvl="6" indent="-171450">
+            <a:pPr marL="171450" lvl="6" indent="-171450" algn="just">
               <a:buSzPct val="100000"/>
               <a:buFont typeface="Symbol" panose="05050102010706020507" pitchFamily="18" charset="2"/>
               <a:buChar char="·"/>
@@ -20169,11 +20241,11 @@
                 <a:ea typeface="Roboto Mono"/>
                 <a:sym typeface="Roboto Mono"/>
               </a:rPr>
-              <a:t> be using any paid licensed products to achieve this: the solution will be built from scratch. </a:t>
+              <a:t> be using any paid licensed products to achieve this; however, we’ll be using Tesseract OCR, a free open source OCR tool for image-to-text utilities.</a:t>
             </a:r>
           </a:p>
           <a:p>
-            <a:pPr marL="171450" lvl="6" indent="-171450">
+            <a:pPr marL="171450" lvl="6" indent="-171450" algn="just">
               <a:buSzPct val="100000"/>
               <a:buFont typeface="Symbol" panose="05050102010706020507" pitchFamily="18" charset="2"/>
               <a:buChar char="·"/>
@@ -20185,7 +20257,7 @@
             </a:endParaRPr>
           </a:p>
           <a:p>
-            <a:pPr marL="171450" lvl="6" indent="-171450">
+            <a:pPr marL="171450" lvl="6" indent="-171450" algn="just">
               <a:buSzPct val="100000"/>
               <a:buFont typeface="Symbol" panose="05050102010706020507" pitchFamily="18" charset="2"/>
               <a:buChar char="·"/>
@@ -20932,8 +21004,8 @@
         </p:nvSpPr>
         <p:spPr>
           <a:xfrm>
-            <a:off x="374574" y="3784276"/>
-            <a:ext cx="8394852" cy="1200329"/>
+            <a:off x="374574" y="3641539"/>
+            <a:ext cx="8394852" cy="1384995"/>
           </a:xfrm>
           <a:prstGeom prst="rect">
             <a:avLst/>
@@ -21046,7 +21118,7 @@
                 <a:latin typeface="Roboto Mono" panose="020B0604020202020204" charset="0"/>
                 <a:ea typeface="Roboto Mono" panose="020B0604020202020204" charset="0"/>
               </a:rPr>
-              <a:t>In our case, the backbone is High-Resolution Network (</a:t>
+              <a:t>In our case, the backbone is High-Resolution Network’s v2 for semantic segmentation (</a:t>
             </a:r>
             <a:r>
               <a:rPr lang="en-US" sz="1200" dirty="0">
@@ -21094,7 +21166,7 @@
         </p:blipFill>
         <p:spPr>
           <a:xfrm>
-            <a:off x="999460" y="865275"/>
+            <a:off x="916748" y="1010550"/>
             <a:ext cx="6786090" cy="2485714"/>
           </a:xfrm>
           <a:prstGeom prst="rect">
@@ -21324,21 +21396,7 @@
                 <a:latin typeface="Roboto Mono" panose="020B0604020202020204" charset="0"/>
                 <a:ea typeface="Roboto Mono" panose="020B0604020202020204" charset="0"/>
               </a:rPr>
-              <a:t>These proposals are then sent to </a:t>
-            </a:r>
-            <a:r>
-              <a:rPr lang="en-US" sz="1200" dirty="0" err="1">
-                <a:latin typeface="Roboto Mono" panose="020B0604020202020204" charset="0"/>
-                <a:ea typeface="Roboto Mono" panose="020B0604020202020204" charset="0"/>
-              </a:rPr>
-              <a:t>RoI</a:t>
-            </a:r>
-            <a:r>
-              <a:rPr lang="en-US" sz="1200" dirty="0">
-                <a:latin typeface="Roboto Mono" panose="020B0604020202020204" charset="0"/>
-                <a:ea typeface="Roboto Mono" panose="020B0604020202020204" charset="0"/>
-              </a:rPr>
-              <a:t> Align layer followed by 3-step cascade classification and bounding-box regression layers. The classifiers are trained to identify the tables and the regression is performed to refine the boxes that contain tables.</a:t>
+              <a:t>These proposals are then sent to RoI (Region of Interest) Align layer followed by 3-step cascade classification and bounding-box regression layers. The classifiers are trained to identify the tables and the regression is performed to refine the boxes that contain tables.</a:t>
             </a:r>
           </a:p>
           <a:p>
@@ -21496,7 +21554,7 @@
         <p:spPr>
           <a:xfrm>
             <a:off x="135875" y="865275"/>
-            <a:ext cx="8394852" cy="2677656"/>
+            <a:ext cx="8394852" cy="3231654"/>
           </a:xfrm>
           <a:prstGeom prst="rect">
             <a:avLst/>
@@ -21633,7 +21691,58 @@
                 <a:latin typeface="Roboto Mono" panose="020B0604020202020204" charset="0"/>
                 <a:ea typeface="Roboto Mono" panose="020B0604020202020204" charset="0"/>
               </a:rPr>
-              <a:t>We plan to use Tesseract OCR, which is deep learning-based OCR and is significantly more accurate.</a:t>
+              <a:t>We plan to use </a:t>
+            </a:r>
+            <a:r>
+              <a:rPr lang="en-US" sz="1200" b="1" dirty="0">
+                <a:latin typeface="Roboto Mono" panose="020B0604020202020204" charset="0"/>
+                <a:ea typeface="Roboto Mono" panose="020B0604020202020204" charset="0"/>
+              </a:rPr>
+              <a:t>Tesseract </a:t>
+            </a:r>
+            <a:r>
+              <a:rPr lang="en-US" sz="1200" dirty="0">
+                <a:latin typeface="Roboto Mono" panose="020B0604020202020204" charset="0"/>
+                <a:ea typeface="Roboto Mono" panose="020B0604020202020204" charset="0"/>
+              </a:rPr>
+              <a:t>OCR, which is a deep learning-based OCR and is significantly more accurate. Tesseract is freely available and has a seamless integration with Python through the </a:t>
+            </a:r>
+            <a:r>
+              <a:rPr lang="en-US" sz="1200" b="1" dirty="0" err="1">
+                <a:latin typeface="Roboto Mono" panose="020B0604020202020204" charset="0"/>
+                <a:ea typeface="Roboto Mono" panose="020B0604020202020204" charset="0"/>
+              </a:rPr>
+              <a:t>pytesseract</a:t>
+            </a:r>
+            <a:r>
+              <a:rPr lang="en-US" sz="1200" dirty="0">
+                <a:latin typeface="Roboto Mono" panose="020B0604020202020204" charset="0"/>
+                <a:ea typeface="Roboto Mono" panose="020B0604020202020204" charset="0"/>
+              </a:rPr>
+              <a:t> package.</a:t>
+            </a:r>
+          </a:p>
+          <a:p>
+            <a:pPr marL="171450" indent="-171450">
+              <a:buFont typeface="Symbol" panose="05050102010706020507" pitchFamily="18" charset="2"/>
+              <a:buChar char="·"/>
+            </a:pPr>
+            <a:endParaRPr lang="en-US" sz="1200" dirty="0">
+              <a:latin typeface="Roboto Mono" panose="020B0604020202020204" charset="0"/>
+              <a:ea typeface="Roboto Mono" panose="020B0604020202020204" charset="0"/>
+            </a:endParaRPr>
+          </a:p>
+          <a:p>
+            <a:pPr marL="171450" indent="-171450">
+              <a:buFont typeface="Symbol" panose="05050102010706020507" pitchFamily="18" charset="2"/>
+              <a:buChar char="·"/>
+            </a:pPr>
+            <a:r>
+              <a:rPr lang="en-US" sz="1200" dirty="0">
+                <a:latin typeface="Roboto Mono" panose="020B0604020202020204" charset="0"/>
+                <a:ea typeface="Roboto Mono" panose="020B0604020202020204" charset="0"/>
+              </a:rPr>
+              <a:t>…</a:t>
             </a:r>
           </a:p>
           <a:p>
@@ -21943,7 +22052,7 @@
                 <a:latin typeface="Roboto Mono" panose="020B0604020202020204" charset="0"/>
                 <a:ea typeface="Roboto Mono" panose="020B0604020202020204" charset="0"/>
               </a:rPr>
-              <a:t>WIP</a:t>
+              <a:t>The only SaaS software that we’re using is </a:t>
             </a:r>
           </a:p>
           <a:p>

</xml_diff>